<commit_message>
Split exercises in seperate file and start slides
</commit_message>
<xml_diff>
--- a/table.pptx
+++ b/table.pptx
@@ -2231,15 +2231,15 @@
             <a:tbl>
               <a:tblPr/>
               <a:tblGrid>
-                <a:gridCol w="866163"/>
-                <a:gridCol w="726599"/>
-                <a:gridCol w="563570"/>
-                <a:gridCol w="726599"/>
-                <a:gridCol w="563570"/>
-                <a:gridCol w="726599"/>
-                <a:gridCol w="563570"/>
+                <a:gridCol w="949110"/>
+                <a:gridCol w="773530"/>
+                <a:gridCol w="591674"/>
+                <a:gridCol w="773530"/>
+                <a:gridCol w="591674"/>
+                <a:gridCol w="773530"/>
+                <a:gridCol w="591674"/>
               </a:tblGrid>
-              <a:tr h="462026">
+              <a:tr h="509947">
                 <a:tc gridSpan="7">
                   <a:txBody>
                     <a:bodyPr/>
@@ -2269,7 +2269,7 @@
                           <a:ea typeface="Merriweather"/>
                           <a:sym typeface="Merriweather"/>
                         </a:rPr>
-                        <a:t>Data is courtesy of the {palmerpenguins} R package</a:t>
+                        <a:t>Penguins in the Palmer Archipelago</a:t>
                       </a:r>
                     </a:p>
                   </a:txBody>
@@ -2330,7 +2330,7 @@
                           <a:ea typeface="Merriweather"/>
                           <a:sym typeface="Merriweather"/>
                         </a:rPr>
-                        <a:t>Data is courtesy of the {palmerpenguins} R package</a:t>
+                        <a:t>Penguins in the Palmer Archipelago</a:t>
                       </a:r>
                     </a:p>
                   </a:txBody>
@@ -2391,7 +2391,7 @@
                           <a:ea typeface="Merriweather"/>
                           <a:sym typeface="Merriweather"/>
                         </a:rPr>
-                        <a:t>Data is courtesy of the {palmerpenguins} R package</a:t>
+                        <a:t>Penguins in the Palmer Archipelago</a:t>
                       </a:r>
                     </a:p>
                   </a:txBody>
@@ -2452,7 +2452,7 @@
                           <a:ea typeface="Merriweather"/>
                           <a:sym typeface="Merriweather"/>
                         </a:rPr>
-                        <a:t>Data is courtesy of the {palmerpenguins} R package</a:t>
+                        <a:t>Penguins in the Palmer Archipelago</a:t>
                       </a:r>
                     </a:p>
                   </a:txBody>
@@ -2513,7 +2513,7 @@
                           <a:ea typeface="Merriweather"/>
                           <a:sym typeface="Merriweather"/>
                         </a:rPr>
-                        <a:t>Data is courtesy of the {palmerpenguins} R package</a:t>
+                        <a:t>Penguins in the Palmer Archipelago</a:t>
                       </a:r>
                     </a:p>
                   </a:txBody>
@@ -2574,7 +2574,7 @@
                           <a:ea typeface="Merriweather"/>
                           <a:sym typeface="Merriweather"/>
                         </a:rPr>
-                        <a:t>Data is courtesy of the {palmerpenguins} R package</a:t>
+                        <a:t>Penguins in the Palmer Archipelago</a:t>
                       </a:r>
                     </a:p>
                   </a:txBody>
@@ -2635,7 +2635,7 @@
                           <a:ea typeface="Merriweather"/>
                           <a:sym typeface="Merriweather"/>
                         </a:rPr>
-                        <a:t>Data is courtesy of the {palmerpenguins} R package</a:t>
+                        <a:t>Penguins in the Palmer Archipelago</a:t>
                       </a:r>
                     </a:p>
                   </a:txBody>
@@ -2668,7 +2668,7 @@
                   </a:tcPr>
                 </a:tc>
               </a:tr>
-              <a:tr h="390173">
+              <a:tr h="390992">
                 <a:tc gridSpan="7">
                   <a:txBody>
                     <a:bodyPr/>
@@ -2698,7 +2698,7 @@
                           <a:ea typeface="Arial"/>
                           <a:sym typeface="Arial"/>
                         </a:rPr>
-                        <a:t>Penguins in the Palmer Archipelago</a:t>
+                        <a:t>Data is courtesy of the {palmerpenguins} R package</a:t>
                       </a:r>
                     </a:p>
                   </a:txBody>
@@ -2755,7 +2755,7 @@
                           <a:ea typeface="Arial"/>
                           <a:sym typeface="Arial"/>
                         </a:rPr>
-                        <a:t>Penguins in the Palmer Archipelago</a:t>
+                        <a:t>Data is courtesy of the {palmerpenguins} R package</a:t>
                       </a:r>
                     </a:p>
                   </a:txBody>
@@ -2812,7 +2812,7 @@
                           <a:ea typeface="Arial"/>
                           <a:sym typeface="Arial"/>
                         </a:rPr>
-                        <a:t>Penguins in the Palmer Archipelago</a:t>
+                        <a:t>Data is courtesy of the {palmerpenguins} R package</a:t>
                       </a:r>
                     </a:p>
                   </a:txBody>
@@ -2869,7 +2869,7 @@
                           <a:ea typeface="Arial"/>
                           <a:sym typeface="Arial"/>
                         </a:rPr>
-                        <a:t>Penguins in the Palmer Archipelago</a:t>
+                        <a:t>Data is courtesy of the {palmerpenguins} R package</a:t>
                       </a:r>
                     </a:p>
                   </a:txBody>
@@ -2926,7 +2926,7 @@
                           <a:ea typeface="Arial"/>
                           <a:sym typeface="Arial"/>
                         </a:rPr>
-                        <a:t>Penguins in the Palmer Archipelago</a:t>
+                        <a:t>Data is courtesy of the {palmerpenguins} R package</a:t>
                       </a:r>
                     </a:p>
                   </a:txBody>
@@ -2983,7 +2983,7 @@
                           <a:ea typeface="Arial"/>
                           <a:sym typeface="Arial"/>
                         </a:rPr>
-                        <a:t>Penguins in the Palmer Archipelago</a:t>
+                        <a:t>Data is courtesy of the {palmerpenguins} R package</a:t>
                       </a:r>
                     </a:p>
                   </a:txBody>
@@ -3040,7 +3040,7 @@
                           <a:ea typeface="Arial"/>
                           <a:sym typeface="Arial"/>
                         </a:rPr>
-                        <a:t>Penguins in the Palmer Archipelago</a:t>
+                        <a:t>Data is courtesy of the {palmerpenguins} R package</a:t>
                       </a:r>
                     </a:p>
                   </a:txBody>
@@ -3069,7 +3069,7 @@
                   </a:tcPr>
                 </a:tc>
               </a:tr>
-              <a:tr h="392492">
+              <a:tr h="395971">
                 <a:tc>
                   <a:txBody>
                     <a:bodyPr/>
@@ -3094,10 +3094,10 @@
                               <a:alpha val="100000"/>
                             </a:srgbClr>
                           </a:solidFill>
-                          <a:latin typeface="Helvetica"/>
-                          <a:cs typeface="Helvetica"/>
-                          <a:ea typeface="Helvetica"/>
-                          <a:sym typeface="Helvetica"/>
+                          <a:latin typeface="DejaVu Sans"/>
+                          <a:cs typeface="DejaVu Sans"/>
+                          <a:ea typeface="DejaVu Sans"/>
+                          <a:sym typeface="DejaVu Sans"/>
                         </a:rPr>
                         <a:t/>
                       </a:r>
@@ -3151,10 +3151,10 @@
                               <a:alpha val="100000"/>
                             </a:srgbClr>
                           </a:solidFill>
-                          <a:latin typeface="Helvetica"/>
-                          <a:cs typeface="Helvetica"/>
-                          <a:ea typeface="Helvetica"/>
-                          <a:sym typeface="Helvetica"/>
+                          <a:latin typeface="DejaVu Sans"/>
+                          <a:cs typeface="DejaVu Sans"/>
+                          <a:ea typeface="DejaVu Sans"/>
+                          <a:sym typeface="DejaVu Sans"/>
                         </a:rPr>
                         <a:t>Adelie</a:t>
                       </a:r>
@@ -3208,10 +3208,10 @@
                               <a:alpha val="100000"/>
                             </a:srgbClr>
                           </a:solidFill>
-                          <a:latin typeface="Helvetica"/>
-                          <a:cs typeface="Helvetica"/>
-                          <a:ea typeface="Helvetica"/>
-                          <a:sym typeface="Helvetica"/>
+                          <a:latin typeface="DejaVu Sans"/>
+                          <a:cs typeface="DejaVu Sans"/>
+                          <a:ea typeface="DejaVu Sans"/>
+                          <a:sym typeface="DejaVu Sans"/>
                         </a:rPr>
                         <a:t>Adelie</a:t>
                       </a:r>
@@ -3265,10 +3265,10 @@
                               <a:alpha val="100000"/>
                             </a:srgbClr>
                           </a:solidFill>
-                          <a:latin typeface="Helvetica"/>
-                          <a:cs typeface="Helvetica"/>
-                          <a:ea typeface="Helvetica"/>
-                          <a:sym typeface="Helvetica"/>
+                          <a:latin typeface="DejaVu Sans"/>
+                          <a:cs typeface="DejaVu Sans"/>
+                          <a:ea typeface="DejaVu Sans"/>
+                          <a:sym typeface="DejaVu Sans"/>
                         </a:rPr>
                         <a:t>Chinstrap</a:t>
                       </a:r>
@@ -3322,10 +3322,10 @@
                               <a:alpha val="100000"/>
                             </a:srgbClr>
                           </a:solidFill>
-                          <a:latin typeface="Helvetica"/>
-                          <a:cs typeface="Helvetica"/>
-                          <a:ea typeface="Helvetica"/>
-                          <a:sym typeface="Helvetica"/>
+                          <a:latin typeface="DejaVu Sans"/>
+                          <a:cs typeface="DejaVu Sans"/>
+                          <a:ea typeface="DejaVu Sans"/>
+                          <a:sym typeface="DejaVu Sans"/>
                         </a:rPr>
                         <a:t>Chinstrap</a:t>
                       </a:r>
@@ -3379,10 +3379,10 @@
                               <a:alpha val="100000"/>
                             </a:srgbClr>
                           </a:solidFill>
-                          <a:latin typeface="Helvetica"/>
-                          <a:cs typeface="Helvetica"/>
-                          <a:ea typeface="Helvetica"/>
-                          <a:sym typeface="Helvetica"/>
+                          <a:latin typeface="DejaVu Sans"/>
+                          <a:cs typeface="DejaVu Sans"/>
+                          <a:ea typeface="DejaVu Sans"/>
+                          <a:sym typeface="DejaVu Sans"/>
                         </a:rPr>
                         <a:t>Gentoo</a:t>
                       </a:r>
@@ -3436,10 +3436,10 @@
                               <a:alpha val="100000"/>
                             </a:srgbClr>
                           </a:solidFill>
-                          <a:latin typeface="Helvetica"/>
-                          <a:cs typeface="Helvetica"/>
-                          <a:ea typeface="Helvetica"/>
-                          <a:sym typeface="Helvetica"/>
+                          <a:latin typeface="DejaVu Sans"/>
+                          <a:cs typeface="DejaVu Sans"/>
+                          <a:ea typeface="DejaVu Sans"/>
+                          <a:sym typeface="DejaVu Sans"/>
                         </a:rPr>
                         <a:t>Gentoo</a:t>
                       </a:r>
@@ -3470,7 +3470,7 @@
                   </a:tcPr>
                 </a:tc>
               </a:tr>
-              <a:tr h="363570">
+              <a:tr h="368891">
                 <a:tc>
                   <a:txBody>
                     <a:bodyPr/>
@@ -3495,12 +3495,12 @@
                               <a:alpha val="100000"/>
                             </a:srgbClr>
                           </a:solidFill>
-                          <a:latin typeface="Helvetica"/>
-                          <a:cs typeface="Helvetica"/>
-                          <a:ea typeface="Helvetica"/>
-                          <a:sym typeface="Helvetica"/>
-                        </a:rPr>
-                        <a:t>Year</a:t>
+                          <a:latin typeface="DejaVu Sans"/>
+                          <a:cs typeface="DejaVu Sans"/>
+                          <a:ea typeface="DejaVu Sans"/>
+                          <a:sym typeface="DejaVu Sans"/>
+                        </a:rPr>
+                        <a:t/>
                       </a:r>
                     </a:p>
                   </a:txBody>
@@ -3556,10 +3556,10 @@
                               <a:alpha val="100000"/>
                             </a:srgbClr>
                           </a:solidFill>
-                          <a:latin typeface="Helvetica"/>
-                          <a:cs typeface="Helvetica"/>
-                          <a:ea typeface="Helvetica"/>
-                          <a:sym typeface="Helvetica"/>
+                          <a:latin typeface="DejaVu Sans"/>
+                          <a:cs typeface="DejaVu Sans"/>
+                          <a:ea typeface="DejaVu Sans"/>
+                          <a:sym typeface="DejaVu Sans"/>
                         </a:rPr>
                         <a:t>Female</a:t>
                       </a:r>
@@ -3617,10 +3617,10 @@
                               <a:alpha val="100000"/>
                             </a:srgbClr>
                           </a:solidFill>
-                          <a:latin typeface="Helvetica"/>
-                          <a:cs typeface="Helvetica"/>
-                          <a:ea typeface="Helvetica"/>
-                          <a:sym typeface="Helvetica"/>
+                          <a:latin typeface="DejaVu Sans"/>
+                          <a:cs typeface="DejaVu Sans"/>
+                          <a:ea typeface="DejaVu Sans"/>
+                          <a:sym typeface="DejaVu Sans"/>
                         </a:rPr>
                         <a:t>Male</a:t>
                       </a:r>
@@ -3678,10 +3678,10 @@
                               <a:alpha val="100000"/>
                             </a:srgbClr>
                           </a:solidFill>
-                          <a:latin typeface="Helvetica"/>
-                          <a:cs typeface="Helvetica"/>
-                          <a:ea typeface="Helvetica"/>
-                          <a:sym typeface="Helvetica"/>
+                          <a:latin typeface="DejaVu Sans"/>
+                          <a:cs typeface="DejaVu Sans"/>
+                          <a:ea typeface="DejaVu Sans"/>
+                          <a:sym typeface="DejaVu Sans"/>
                         </a:rPr>
                         <a:t>Female</a:t>
                       </a:r>
@@ -3739,10 +3739,10 @@
                               <a:alpha val="100000"/>
                             </a:srgbClr>
                           </a:solidFill>
-                          <a:latin typeface="Helvetica"/>
-                          <a:cs typeface="Helvetica"/>
-                          <a:ea typeface="Helvetica"/>
-                          <a:sym typeface="Helvetica"/>
+                          <a:latin typeface="DejaVu Sans"/>
+                          <a:cs typeface="DejaVu Sans"/>
+                          <a:ea typeface="DejaVu Sans"/>
+                          <a:sym typeface="DejaVu Sans"/>
                         </a:rPr>
                         <a:t>Male</a:t>
                       </a:r>
@@ -3800,10 +3800,10 @@
                               <a:alpha val="100000"/>
                             </a:srgbClr>
                           </a:solidFill>
-                          <a:latin typeface="Helvetica"/>
-                          <a:cs typeface="Helvetica"/>
-                          <a:ea typeface="Helvetica"/>
-                          <a:sym typeface="Helvetica"/>
+                          <a:latin typeface="DejaVu Sans"/>
+                          <a:cs typeface="DejaVu Sans"/>
+                          <a:ea typeface="DejaVu Sans"/>
+                          <a:sym typeface="DejaVu Sans"/>
                         </a:rPr>
                         <a:t>Female</a:t>
                       </a:r>
@@ -3861,10 +3861,10 @@
                               <a:alpha val="100000"/>
                             </a:srgbClr>
                           </a:solidFill>
-                          <a:latin typeface="Helvetica"/>
-                          <a:cs typeface="Helvetica"/>
-                          <a:ea typeface="Helvetica"/>
-                          <a:sym typeface="Helvetica"/>
+                          <a:latin typeface="DejaVu Sans"/>
+                          <a:cs typeface="DejaVu Sans"/>
+                          <a:ea typeface="DejaVu Sans"/>
+                          <a:sym typeface="DejaVu Sans"/>
                         </a:rPr>
                         <a:t>Male</a:t>
                       </a:r>
@@ -3899,7 +3899,7 @@
                   </a:tcPr>
                 </a:tc>
               </a:tr>
-              <a:tr h="371650">
+              <a:tr h="372692">
                 <a:tc gridSpan="7">
                   <a:txBody>
                     <a:bodyPr/>
@@ -4356,7 +4356,7 @@
                   </a:tcPr>
                 </a:tc>
               </a:tr>
-              <a:tr h="361456">
+              <a:tr h="366435">
                 <a:tc>
                   <a:txBody>
                     <a:bodyPr/>
@@ -4381,10 +4381,10 @@
                               <a:alpha val="100000"/>
                             </a:srgbClr>
                           </a:solidFill>
-                          <a:latin typeface="Helvetica"/>
-                          <a:cs typeface="Helvetica"/>
-                          <a:ea typeface="Helvetica"/>
-                          <a:sym typeface="Helvetica"/>
+                          <a:latin typeface="DejaVu Sans"/>
+                          <a:cs typeface="DejaVu Sans"/>
+                          <a:ea typeface="DejaVu Sans"/>
+                          <a:sym typeface="DejaVu Sans"/>
                         </a:rPr>
                         <a:t>2007</a:t>
                       </a:r>
@@ -4446,10 +4446,10 @@
                               <a:alpha val="100000"/>
                             </a:srgbClr>
                           </a:solidFill>
-                          <a:latin typeface="Helvetica"/>
-                          <a:cs typeface="Helvetica"/>
-                          <a:ea typeface="Helvetica"/>
-                          <a:sym typeface="Helvetica"/>
+                          <a:latin typeface="DejaVu Sans"/>
+                          <a:cs typeface="DejaVu Sans"/>
+                          <a:ea typeface="DejaVu Sans"/>
+                          <a:sym typeface="DejaVu Sans"/>
                         </a:rPr>
                         <a:t>5</a:t>
                       </a:r>
@@ -4507,10 +4507,10 @@
                               <a:alpha val="100000"/>
                             </a:srgbClr>
                           </a:solidFill>
-                          <a:latin typeface="Helvetica"/>
-                          <a:cs typeface="Helvetica"/>
-                          <a:ea typeface="Helvetica"/>
-                          <a:sym typeface="Helvetica"/>
+                          <a:latin typeface="DejaVu Sans"/>
+                          <a:cs typeface="DejaVu Sans"/>
+                          <a:ea typeface="DejaVu Sans"/>
+                          <a:sym typeface="DejaVu Sans"/>
                         </a:rPr>
                         <a:t>5</a:t>
                       </a:r>
@@ -4568,10 +4568,10 @@
                               <a:alpha val="100000"/>
                             </a:srgbClr>
                           </a:solidFill>
-                          <a:latin typeface="Helvetica"/>
-                          <a:cs typeface="Helvetica"/>
-                          <a:ea typeface="Helvetica"/>
-                          <a:sym typeface="Helvetica"/>
+                          <a:latin typeface="DejaVu Sans"/>
+                          <a:cs typeface="DejaVu Sans"/>
+                          <a:ea typeface="DejaVu Sans"/>
+                          <a:sym typeface="DejaVu Sans"/>
                         </a:rPr>
                         <a:t>-</a:t>
                       </a:r>
@@ -4629,10 +4629,10 @@
                               <a:alpha val="100000"/>
                             </a:srgbClr>
                           </a:solidFill>
-                          <a:latin typeface="Helvetica"/>
-                          <a:cs typeface="Helvetica"/>
-                          <a:ea typeface="Helvetica"/>
-                          <a:sym typeface="Helvetica"/>
+                          <a:latin typeface="DejaVu Sans"/>
+                          <a:cs typeface="DejaVu Sans"/>
+                          <a:ea typeface="DejaVu Sans"/>
+                          <a:sym typeface="DejaVu Sans"/>
                         </a:rPr>
                         <a:t>-</a:t>
                       </a:r>
@@ -4690,10 +4690,10 @@
                               <a:alpha val="100000"/>
                             </a:srgbClr>
                           </a:solidFill>
-                          <a:latin typeface="Helvetica"/>
-                          <a:cs typeface="Helvetica"/>
-                          <a:ea typeface="Helvetica"/>
-                          <a:sym typeface="Helvetica"/>
+                          <a:latin typeface="DejaVu Sans"/>
+                          <a:cs typeface="DejaVu Sans"/>
+                          <a:ea typeface="DejaVu Sans"/>
+                          <a:sym typeface="DejaVu Sans"/>
                         </a:rPr>
                         <a:t>16</a:t>
                       </a:r>
@@ -4751,10 +4751,10 @@
                               <a:alpha val="100000"/>
                             </a:srgbClr>
                           </a:solidFill>
-                          <a:latin typeface="Helvetica"/>
-                          <a:cs typeface="Helvetica"/>
-                          <a:ea typeface="Helvetica"/>
-                          <a:sym typeface="Helvetica"/>
+                          <a:latin typeface="DejaVu Sans"/>
+                          <a:cs typeface="DejaVu Sans"/>
+                          <a:ea typeface="DejaVu Sans"/>
+                          <a:sym typeface="DejaVu Sans"/>
                         </a:rPr>
                         <a:t>17</a:t>
                       </a:r>
@@ -4789,7 +4789,7 @@
                   </a:tcPr>
                 </a:tc>
               </a:tr>
-              <a:tr h="361592">
+              <a:tr h="366435">
                 <a:tc>
                   <a:txBody>
                     <a:bodyPr/>
@@ -4814,10 +4814,10 @@
                               <a:alpha val="100000"/>
                             </a:srgbClr>
                           </a:solidFill>
-                          <a:latin typeface="Helvetica"/>
-                          <a:cs typeface="Helvetica"/>
-                          <a:ea typeface="Helvetica"/>
-                          <a:sym typeface="Helvetica"/>
+                          <a:latin typeface="DejaVu Sans"/>
+                          <a:cs typeface="DejaVu Sans"/>
+                          <a:ea typeface="DejaVu Sans"/>
+                          <a:sym typeface="DejaVu Sans"/>
                         </a:rPr>
                         <a:t>2008</a:t>
                       </a:r>
@@ -4875,10 +4875,10 @@
                               <a:alpha val="100000"/>
                             </a:srgbClr>
                           </a:solidFill>
-                          <a:latin typeface="Helvetica"/>
-                          <a:cs typeface="Helvetica"/>
-                          <a:ea typeface="Helvetica"/>
-                          <a:sym typeface="Helvetica"/>
+                          <a:latin typeface="DejaVu Sans"/>
+                          <a:cs typeface="DejaVu Sans"/>
+                          <a:ea typeface="DejaVu Sans"/>
+                          <a:sym typeface="DejaVu Sans"/>
                         </a:rPr>
                         <a:t>9</a:t>
                       </a:r>
@@ -4932,10 +4932,10 @@
                               <a:alpha val="100000"/>
                             </a:srgbClr>
                           </a:solidFill>
-                          <a:latin typeface="Helvetica"/>
-                          <a:cs typeface="Helvetica"/>
-                          <a:ea typeface="Helvetica"/>
-                          <a:sym typeface="Helvetica"/>
+                          <a:latin typeface="DejaVu Sans"/>
+                          <a:cs typeface="DejaVu Sans"/>
+                          <a:ea typeface="DejaVu Sans"/>
+                          <a:sym typeface="DejaVu Sans"/>
                         </a:rPr>
                         <a:t>9</a:t>
                       </a:r>
@@ -4989,10 +4989,10 @@
                               <a:alpha val="100000"/>
                             </a:srgbClr>
                           </a:solidFill>
-                          <a:latin typeface="Helvetica"/>
-                          <a:cs typeface="Helvetica"/>
-                          <a:ea typeface="Helvetica"/>
-                          <a:sym typeface="Helvetica"/>
+                          <a:latin typeface="DejaVu Sans"/>
+                          <a:cs typeface="DejaVu Sans"/>
+                          <a:ea typeface="DejaVu Sans"/>
+                          <a:sym typeface="DejaVu Sans"/>
                         </a:rPr>
                         <a:t>-</a:t>
                       </a:r>
@@ -5046,10 +5046,10 @@
                               <a:alpha val="100000"/>
                             </a:srgbClr>
                           </a:solidFill>
-                          <a:latin typeface="Helvetica"/>
-                          <a:cs typeface="Helvetica"/>
-                          <a:ea typeface="Helvetica"/>
-                          <a:sym typeface="Helvetica"/>
+                          <a:latin typeface="DejaVu Sans"/>
+                          <a:cs typeface="DejaVu Sans"/>
+                          <a:ea typeface="DejaVu Sans"/>
+                          <a:sym typeface="DejaVu Sans"/>
                         </a:rPr>
                         <a:t>-</a:t>
                       </a:r>
@@ -5103,10 +5103,10 @@
                               <a:alpha val="100000"/>
                             </a:srgbClr>
                           </a:solidFill>
-                          <a:latin typeface="Helvetica"/>
-                          <a:cs typeface="Helvetica"/>
-                          <a:ea typeface="Helvetica"/>
-                          <a:sym typeface="Helvetica"/>
+                          <a:latin typeface="DejaVu Sans"/>
+                          <a:cs typeface="DejaVu Sans"/>
+                          <a:ea typeface="DejaVu Sans"/>
+                          <a:sym typeface="DejaVu Sans"/>
                         </a:rPr>
                         <a:t>22</a:t>
                       </a:r>
@@ -5160,10 +5160,10 @@
                               <a:alpha val="100000"/>
                             </a:srgbClr>
                           </a:solidFill>
-                          <a:latin typeface="Helvetica"/>
-                          <a:cs typeface="Helvetica"/>
-                          <a:ea typeface="Helvetica"/>
-                          <a:sym typeface="Helvetica"/>
+                          <a:latin typeface="DejaVu Sans"/>
+                          <a:cs typeface="DejaVu Sans"/>
+                          <a:ea typeface="DejaVu Sans"/>
+                          <a:sym typeface="DejaVu Sans"/>
                         </a:rPr>
                         <a:t>23</a:t>
                       </a:r>
@@ -5194,7 +5194,7 @@
                   </a:tcPr>
                 </a:tc>
               </a:tr>
-              <a:tr h="361524">
+              <a:tr h="366435">
                 <a:tc>
                   <a:txBody>
                     <a:bodyPr/>
@@ -5219,10 +5219,10 @@
                               <a:alpha val="100000"/>
                             </a:srgbClr>
                           </a:solidFill>
-                          <a:latin typeface="Helvetica"/>
-                          <a:cs typeface="Helvetica"/>
-                          <a:ea typeface="Helvetica"/>
-                          <a:sym typeface="Helvetica"/>
+                          <a:latin typeface="DejaVu Sans"/>
+                          <a:cs typeface="DejaVu Sans"/>
+                          <a:ea typeface="DejaVu Sans"/>
+                          <a:sym typeface="DejaVu Sans"/>
                         </a:rPr>
                         <a:t>2009</a:t>
                       </a:r>
@@ -5284,10 +5284,10 @@
                               <a:alpha val="100000"/>
                             </a:srgbClr>
                           </a:solidFill>
-                          <a:latin typeface="Helvetica"/>
-                          <a:cs typeface="Helvetica"/>
-                          <a:ea typeface="Helvetica"/>
-                          <a:sym typeface="Helvetica"/>
+                          <a:latin typeface="DejaVu Sans"/>
+                          <a:cs typeface="DejaVu Sans"/>
+                          <a:ea typeface="DejaVu Sans"/>
+                          <a:sym typeface="DejaVu Sans"/>
                         </a:rPr>
                         <a:t>8</a:t>
                       </a:r>
@@ -5345,10 +5345,10 @@
                               <a:alpha val="100000"/>
                             </a:srgbClr>
                           </a:solidFill>
-                          <a:latin typeface="Helvetica"/>
-                          <a:cs typeface="Helvetica"/>
-                          <a:ea typeface="Helvetica"/>
-                          <a:sym typeface="Helvetica"/>
+                          <a:latin typeface="DejaVu Sans"/>
+                          <a:cs typeface="DejaVu Sans"/>
+                          <a:ea typeface="DejaVu Sans"/>
+                          <a:sym typeface="DejaVu Sans"/>
                         </a:rPr>
                         <a:t>8</a:t>
                       </a:r>
@@ -5406,10 +5406,10 @@
                               <a:alpha val="100000"/>
                             </a:srgbClr>
                           </a:solidFill>
-                          <a:latin typeface="Helvetica"/>
-                          <a:cs typeface="Helvetica"/>
-                          <a:ea typeface="Helvetica"/>
-                          <a:sym typeface="Helvetica"/>
+                          <a:latin typeface="DejaVu Sans"/>
+                          <a:cs typeface="DejaVu Sans"/>
+                          <a:ea typeface="DejaVu Sans"/>
+                          <a:sym typeface="DejaVu Sans"/>
                         </a:rPr>
                         <a:t>-</a:t>
                       </a:r>
@@ -5467,10 +5467,10 @@
                               <a:alpha val="100000"/>
                             </a:srgbClr>
                           </a:solidFill>
-                          <a:latin typeface="Helvetica"/>
-                          <a:cs typeface="Helvetica"/>
-                          <a:ea typeface="Helvetica"/>
-                          <a:sym typeface="Helvetica"/>
+                          <a:latin typeface="DejaVu Sans"/>
+                          <a:cs typeface="DejaVu Sans"/>
+                          <a:ea typeface="DejaVu Sans"/>
+                          <a:sym typeface="DejaVu Sans"/>
                         </a:rPr>
                         <a:t>-</a:t>
                       </a:r>
@@ -5528,10 +5528,10 @@
                               <a:alpha val="100000"/>
                             </a:srgbClr>
                           </a:solidFill>
-                          <a:latin typeface="Helvetica"/>
-                          <a:cs typeface="Helvetica"/>
-                          <a:ea typeface="Helvetica"/>
-                          <a:sym typeface="Helvetica"/>
+                          <a:latin typeface="DejaVu Sans"/>
+                          <a:cs typeface="DejaVu Sans"/>
+                          <a:ea typeface="DejaVu Sans"/>
+                          <a:sym typeface="DejaVu Sans"/>
                         </a:rPr>
                         <a:t>20</a:t>
                       </a:r>
@@ -5589,10 +5589,10 @@
                               <a:alpha val="100000"/>
                             </a:srgbClr>
                           </a:solidFill>
-                          <a:latin typeface="Helvetica"/>
-                          <a:cs typeface="Helvetica"/>
-                          <a:ea typeface="Helvetica"/>
-                          <a:sym typeface="Helvetica"/>
+                          <a:latin typeface="DejaVu Sans"/>
+                          <a:cs typeface="DejaVu Sans"/>
+                          <a:ea typeface="DejaVu Sans"/>
+                          <a:sym typeface="DejaVu Sans"/>
                         </a:rPr>
                         <a:t>21</a:t>
                       </a:r>
@@ -5627,7 +5627,7 @@
                   </a:tcPr>
                 </a:tc>
               </a:tr>
-              <a:tr h="363434">
+              <a:tr h="368891">
                 <a:tc>
                   <a:txBody>
                     <a:bodyPr/>
@@ -5652,10 +5652,10 @@
                               <a:alpha val="100000"/>
                             </a:srgbClr>
                           </a:solidFill>
-                          <a:latin typeface="Helvetica"/>
-                          <a:cs typeface="Helvetica"/>
-                          <a:ea typeface="Helvetica"/>
-                          <a:sym typeface="Helvetica"/>
+                          <a:latin typeface="DejaVu Sans"/>
+                          <a:cs typeface="DejaVu Sans"/>
+                          <a:ea typeface="DejaVu Sans"/>
+                          <a:sym typeface="DejaVu Sans"/>
                         </a:rPr>
                         <a:t>Maximum</a:t>
                       </a:r>
@@ -5717,10 +5717,10 @@
                               <a:alpha val="100000"/>
                             </a:srgbClr>
                           </a:solidFill>
-                          <a:latin typeface="Helvetica"/>
-                          <a:cs typeface="Helvetica"/>
-                          <a:ea typeface="Helvetica"/>
-                          <a:sym typeface="Helvetica"/>
+                          <a:latin typeface="DejaVu Sans"/>
+                          <a:cs typeface="DejaVu Sans"/>
+                          <a:ea typeface="DejaVu Sans"/>
+                          <a:sym typeface="DejaVu Sans"/>
                         </a:rPr>
                         <a:t>9</a:t>
                       </a:r>
@@ -5778,10 +5778,10 @@
                               <a:alpha val="100000"/>
                             </a:srgbClr>
                           </a:solidFill>
-                          <a:latin typeface="Helvetica"/>
-                          <a:cs typeface="Helvetica"/>
-                          <a:ea typeface="Helvetica"/>
-                          <a:sym typeface="Helvetica"/>
+                          <a:latin typeface="DejaVu Sans"/>
+                          <a:cs typeface="DejaVu Sans"/>
+                          <a:ea typeface="DejaVu Sans"/>
+                          <a:sym typeface="DejaVu Sans"/>
                         </a:rPr>
                         <a:t>9</a:t>
                       </a:r>
@@ -5839,10 +5839,10 @@
                               <a:alpha val="100000"/>
                             </a:srgbClr>
                           </a:solidFill>
-                          <a:latin typeface="Helvetica"/>
-                          <a:cs typeface="Helvetica"/>
-                          <a:ea typeface="Helvetica"/>
-                          <a:sym typeface="Helvetica"/>
+                          <a:latin typeface="DejaVu Sans"/>
+                          <a:cs typeface="DejaVu Sans"/>
+                          <a:ea typeface="DejaVu Sans"/>
+                          <a:sym typeface="DejaVu Sans"/>
                         </a:rPr>
                         <a:t>-</a:t>
                       </a:r>
@@ -5900,10 +5900,10 @@
                               <a:alpha val="100000"/>
                             </a:srgbClr>
                           </a:solidFill>
-                          <a:latin typeface="Helvetica"/>
-                          <a:cs typeface="Helvetica"/>
-                          <a:ea typeface="Helvetica"/>
-                          <a:sym typeface="Helvetica"/>
+                          <a:latin typeface="DejaVu Sans"/>
+                          <a:cs typeface="DejaVu Sans"/>
+                          <a:ea typeface="DejaVu Sans"/>
+                          <a:sym typeface="DejaVu Sans"/>
                         </a:rPr>
                         <a:t>-</a:t>
                       </a:r>
@@ -5961,10 +5961,10 @@
                               <a:alpha val="100000"/>
                             </a:srgbClr>
                           </a:solidFill>
-                          <a:latin typeface="Helvetica"/>
-                          <a:cs typeface="Helvetica"/>
-                          <a:ea typeface="Helvetica"/>
-                          <a:sym typeface="Helvetica"/>
+                          <a:latin typeface="DejaVu Sans"/>
+                          <a:cs typeface="DejaVu Sans"/>
+                          <a:ea typeface="DejaVu Sans"/>
+                          <a:sym typeface="DejaVu Sans"/>
                         </a:rPr>
                         <a:t>22</a:t>
                       </a:r>
@@ -6022,10 +6022,10 @@
                               <a:alpha val="100000"/>
                             </a:srgbClr>
                           </a:solidFill>
-                          <a:latin typeface="Helvetica"/>
-                          <a:cs typeface="Helvetica"/>
-                          <a:ea typeface="Helvetica"/>
-                          <a:sym typeface="Helvetica"/>
+                          <a:latin typeface="DejaVu Sans"/>
+                          <a:cs typeface="DejaVu Sans"/>
+                          <a:ea typeface="DejaVu Sans"/>
+                          <a:sym typeface="DejaVu Sans"/>
                         </a:rPr>
                         <a:t>23</a:t>
                       </a:r>
@@ -6060,7 +6060,7 @@
                   </a:tcPr>
                 </a:tc>
               </a:tr>
-              <a:tr h="363638">
+              <a:tr h="368891">
                 <a:tc>
                   <a:txBody>
                     <a:bodyPr/>
@@ -6085,10 +6085,10 @@
                               <a:alpha val="100000"/>
                             </a:srgbClr>
                           </a:solidFill>
-                          <a:latin typeface="Helvetica"/>
-                          <a:cs typeface="Helvetica"/>
-                          <a:ea typeface="Helvetica"/>
-                          <a:sym typeface="Helvetica"/>
+                          <a:latin typeface="DejaVu Sans"/>
+                          <a:cs typeface="DejaVu Sans"/>
+                          <a:ea typeface="DejaVu Sans"/>
+                          <a:sym typeface="DejaVu Sans"/>
                         </a:rPr>
                         <a:t>Total</a:t>
                       </a:r>
@@ -6150,10 +6150,10 @@
                               <a:alpha val="100000"/>
                             </a:srgbClr>
                           </a:solidFill>
-                          <a:latin typeface="Helvetica"/>
-                          <a:cs typeface="Helvetica"/>
-                          <a:ea typeface="Helvetica"/>
-                          <a:sym typeface="Helvetica"/>
+                          <a:latin typeface="DejaVu Sans"/>
+                          <a:cs typeface="DejaVu Sans"/>
+                          <a:ea typeface="DejaVu Sans"/>
+                          <a:sym typeface="DejaVu Sans"/>
                         </a:rPr>
                         <a:t>22</a:t>
                       </a:r>
@@ -6211,10 +6211,10 @@
                               <a:alpha val="100000"/>
                             </a:srgbClr>
                           </a:solidFill>
-                          <a:latin typeface="Helvetica"/>
-                          <a:cs typeface="Helvetica"/>
-                          <a:ea typeface="Helvetica"/>
-                          <a:sym typeface="Helvetica"/>
+                          <a:latin typeface="DejaVu Sans"/>
+                          <a:cs typeface="DejaVu Sans"/>
+                          <a:ea typeface="DejaVu Sans"/>
+                          <a:sym typeface="DejaVu Sans"/>
                         </a:rPr>
                         <a:t>22</a:t>
                       </a:r>
@@ -6272,10 +6272,10 @@
                               <a:alpha val="100000"/>
                             </a:srgbClr>
                           </a:solidFill>
-                          <a:latin typeface="Helvetica"/>
-                          <a:cs typeface="Helvetica"/>
-                          <a:ea typeface="Helvetica"/>
-                          <a:sym typeface="Helvetica"/>
+                          <a:latin typeface="DejaVu Sans"/>
+                          <a:cs typeface="DejaVu Sans"/>
+                          <a:ea typeface="DejaVu Sans"/>
+                          <a:sym typeface="DejaVu Sans"/>
                         </a:rPr>
                         <a:t>-</a:t>
                       </a:r>
@@ -6333,10 +6333,10 @@
                               <a:alpha val="100000"/>
                             </a:srgbClr>
                           </a:solidFill>
-                          <a:latin typeface="Helvetica"/>
-                          <a:cs typeface="Helvetica"/>
-                          <a:ea typeface="Helvetica"/>
-                          <a:sym typeface="Helvetica"/>
+                          <a:latin typeface="DejaVu Sans"/>
+                          <a:cs typeface="DejaVu Sans"/>
+                          <a:ea typeface="DejaVu Sans"/>
+                          <a:sym typeface="DejaVu Sans"/>
                         </a:rPr>
                         <a:t>-</a:t>
                       </a:r>
@@ -6394,10 +6394,10 @@
                               <a:alpha val="100000"/>
                             </a:srgbClr>
                           </a:solidFill>
-                          <a:latin typeface="Helvetica"/>
-                          <a:cs typeface="Helvetica"/>
-                          <a:ea typeface="Helvetica"/>
-                          <a:sym typeface="Helvetica"/>
+                          <a:latin typeface="DejaVu Sans"/>
+                          <a:cs typeface="DejaVu Sans"/>
+                          <a:ea typeface="DejaVu Sans"/>
+                          <a:sym typeface="DejaVu Sans"/>
                         </a:rPr>
                         <a:t>58</a:t>
                       </a:r>
@@ -6455,10 +6455,10 @@
                               <a:alpha val="100000"/>
                             </a:srgbClr>
                           </a:solidFill>
-                          <a:latin typeface="Helvetica"/>
-                          <a:cs typeface="Helvetica"/>
-                          <a:ea typeface="Helvetica"/>
-                          <a:sym typeface="Helvetica"/>
+                          <a:latin typeface="DejaVu Sans"/>
+                          <a:cs typeface="DejaVu Sans"/>
+                          <a:ea typeface="DejaVu Sans"/>
+                          <a:sym typeface="DejaVu Sans"/>
                         </a:rPr>
                         <a:t>61</a:t>
                       </a:r>
@@ -6493,7 +6493,7 @@
                   </a:tcPr>
                 </a:tc>
               </a:tr>
-              <a:tr h="371650">
+              <a:tr h="372692">
                 <a:tc gridSpan="7">
                   <a:txBody>
                     <a:bodyPr/>
@@ -6950,7 +6950,7 @@
                   </a:tcPr>
                 </a:tc>
               </a:tr>
-              <a:tr h="361456">
+              <a:tr h="366435">
                 <a:tc>
                   <a:txBody>
                     <a:bodyPr/>
@@ -6975,10 +6975,10 @@
                               <a:alpha val="100000"/>
                             </a:srgbClr>
                           </a:solidFill>
-                          <a:latin typeface="Helvetica"/>
-                          <a:cs typeface="Helvetica"/>
-                          <a:ea typeface="Helvetica"/>
-                          <a:sym typeface="Helvetica"/>
+                          <a:latin typeface="DejaVu Sans"/>
+                          <a:cs typeface="DejaVu Sans"/>
+                          <a:ea typeface="DejaVu Sans"/>
+                          <a:sym typeface="DejaVu Sans"/>
                         </a:rPr>
                         <a:t>2007</a:t>
                       </a:r>
@@ -7040,10 +7040,10 @@
                               <a:alpha val="100000"/>
                             </a:srgbClr>
                           </a:solidFill>
-                          <a:latin typeface="Helvetica"/>
-                          <a:cs typeface="Helvetica"/>
-                          <a:ea typeface="Helvetica"/>
-                          <a:sym typeface="Helvetica"/>
+                          <a:latin typeface="DejaVu Sans"/>
+                          <a:cs typeface="DejaVu Sans"/>
+                          <a:ea typeface="DejaVu Sans"/>
+                          <a:sym typeface="DejaVu Sans"/>
                         </a:rPr>
                         <a:t>9</a:t>
                       </a:r>
@@ -7101,10 +7101,10 @@
                               <a:alpha val="100000"/>
                             </a:srgbClr>
                           </a:solidFill>
-                          <a:latin typeface="Helvetica"/>
-                          <a:cs typeface="Helvetica"/>
-                          <a:ea typeface="Helvetica"/>
-                          <a:sym typeface="Helvetica"/>
+                          <a:latin typeface="DejaVu Sans"/>
+                          <a:cs typeface="DejaVu Sans"/>
+                          <a:ea typeface="DejaVu Sans"/>
+                          <a:sym typeface="DejaVu Sans"/>
                         </a:rPr>
                         <a:t>10</a:t>
                       </a:r>
@@ -7162,10 +7162,10 @@
                               <a:alpha val="100000"/>
                             </a:srgbClr>
                           </a:solidFill>
-                          <a:latin typeface="Helvetica"/>
-                          <a:cs typeface="Helvetica"/>
-                          <a:ea typeface="Helvetica"/>
-                          <a:sym typeface="Helvetica"/>
+                          <a:latin typeface="DejaVu Sans"/>
+                          <a:cs typeface="DejaVu Sans"/>
+                          <a:ea typeface="DejaVu Sans"/>
+                          <a:sym typeface="DejaVu Sans"/>
                         </a:rPr>
                         <a:t>13</a:t>
                       </a:r>
@@ -7223,10 +7223,10 @@
                               <a:alpha val="100000"/>
                             </a:srgbClr>
                           </a:solidFill>
-                          <a:latin typeface="Helvetica"/>
-                          <a:cs typeface="Helvetica"/>
-                          <a:ea typeface="Helvetica"/>
-                          <a:sym typeface="Helvetica"/>
+                          <a:latin typeface="DejaVu Sans"/>
+                          <a:cs typeface="DejaVu Sans"/>
+                          <a:ea typeface="DejaVu Sans"/>
+                          <a:sym typeface="DejaVu Sans"/>
                         </a:rPr>
                         <a:t>13</a:t>
                       </a:r>
@@ -7284,10 +7284,10 @@
                               <a:alpha val="100000"/>
                             </a:srgbClr>
                           </a:solidFill>
-                          <a:latin typeface="Helvetica"/>
-                          <a:cs typeface="Helvetica"/>
-                          <a:ea typeface="Helvetica"/>
-                          <a:sym typeface="Helvetica"/>
+                          <a:latin typeface="DejaVu Sans"/>
+                          <a:cs typeface="DejaVu Sans"/>
+                          <a:ea typeface="DejaVu Sans"/>
+                          <a:sym typeface="DejaVu Sans"/>
                         </a:rPr>
                         <a:t>-</a:t>
                       </a:r>
@@ -7345,10 +7345,10 @@
                               <a:alpha val="100000"/>
                             </a:srgbClr>
                           </a:solidFill>
-                          <a:latin typeface="Helvetica"/>
-                          <a:cs typeface="Helvetica"/>
-                          <a:ea typeface="Helvetica"/>
-                          <a:sym typeface="Helvetica"/>
+                          <a:latin typeface="DejaVu Sans"/>
+                          <a:cs typeface="DejaVu Sans"/>
+                          <a:ea typeface="DejaVu Sans"/>
+                          <a:sym typeface="DejaVu Sans"/>
                         </a:rPr>
                         <a:t>-</a:t>
                       </a:r>
@@ -7383,7 +7383,7 @@
                   </a:tcPr>
                 </a:tc>
               </a:tr>
-              <a:tr h="361592">
+              <a:tr h="366435">
                 <a:tc>
                   <a:txBody>
                     <a:bodyPr/>
@@ -7408,10 +7408,10 @@
                               <a:alpha val="100000"/>
                             </a:srgbClr>
                           </a:solidFill>
-                          <a:latin typeface="Helvetica"/>
-                          <a:cs typeface="Helvetica"/>
-                          <a:ea typeface="Helvetica"/>
-                          <a:sym typeface="Helvetica"/>
+                          <a:latin typeface="DejaVu Sans"/>
+                          <a:cs typeface="DejaVu Sans"/>
+                          <a:ea typeface="DejaVu Sans"/>
+                          <a:sym typeface="DejaVu Sans"/>
                         </a:rPr>
                         <a:t>2008</a:t>
                       </a:r>
@@ -7469,10 +7469,10 @@
                               <a:alpha val="100000"/>
                             </a:srgbClr>
                           </a:solidFill>
-                          <a:latin typeface="Helvetica"/>
-                          <a:cs typeface="Helvetica"/>
-                          <a:ea typeface="Helvetica"/>
-                          <a:sym typeface="Helvetica"/>
+                          <a:latin typeface="DejaVu Sans"/>
+                          <a:cs typeface="DejaVu Sans"/>
+                          <a:ea typeface="DejaVu Sans"/>
+                          <a:sym typeface="DejaVu Sans"/>
                         </a:rPr>
                         <a:t>8</a:t>
                       </a:r>
@@ -7526,10 +7526,10 @@
                               <a:alpha val="100000"/>
                             </a:srgbClr>
                           </a:solidFill>
-                          <a:latin typeface="Helvetica"/>
-                          <a:cs typeface="Helvetica"/>
-                          <a:ea typeface="Helvetica"/>
-                          <a:sym typeface="Helvetica"/>
+                          <a:latin typeface="DejaVu Sans"/>
+                          <a:cs typeface="DejaVu Sans"/>
+                          <a:ea typeface="DejaVu Sans"/>
+                          <a:sym typeface="DejaVu Sans"/>
                         </a:rPr>
                         <a:t>8</a:t>
                       </a:r>
@@ -7583,10 +7583,10 @@
                               <a:alpha val="100000"/>
                             </a:srgbClr>
                           </a:solidFill>
-                          <a:latin typeface="Helvetica"/>
-                          <a:cs typeface="Helvetica"/>
-                          <a:ea typeface="Helvetica"/>
-                          <a:sym typeface="Helvetica"/>
+                          <a:latin typeface="DejaVu Sans"/>
+                          <a:cs typeface="DejaVu Sans"/>
+                          <a:ea typeface="DejaVu Sans"/>
+                          <a:sym typeface="DejaVu Sans"/>
                         </a:rPr>
                         <a:t>9</a:t>
                       </a:r>
@@ -7640,10 +7640,10 @@
                               <a:alpha val="100000"/>
                             </a:srgbClr>
                           </a:solidFill>
-                          <a:latin typeface="Helvetica"/>
-                          <a:cs typeface="Helvetica"/>
-                          <a:ea typeface="Helvetica"/>
-                          <a:sym typeface="Helvetica"/>
+                          <a:latin typeface="DejaVu Sans"/>
+                          <a:cs typeface="DejaVu Sans"/>
+                          <a:ea typeface="DejaVu Sans"/>
+                          <a:sym typeface="DejaVu Sans"/>
                         </a:rPr>
                         <a:t>9</a:t>
                       </a:r>
@@ -7697,10 +7697,10 @@
                               <a:alpha val="100000"/>
                             </a:srgbClr>
                           </a:solidFill>
-                          <a:latin typeface="Helvetica"/>
-                          <a:cs typeface="Helvetica"/>
-                          <a:ea typeface="Helvetica"/>
-                          <a:sym typeface="Helvetica"/>
+                          <a:latin typeface="DejaVu Sans"/>
+                          <a:cs typeface="DejaVu Sans"/>
+                          <a:ea typeface="DejaVu Sans"/>
+                          <a:sym typeface="DejaVu Sans"/>
                         </a:rPr>
                         <a:t>-</a:t>
                       </a:r>
@@ -7754,10 +7754,10 @@
                               <a:alpha val="100000"/>
                             </a:srgbClr>
                           </a:solidFill>
-                          <a:latin typeface="Helvetica"/>
-                          <a:cs typeface="Helvetica"/>
-                          <a:ea typeface="Helvetica"/>
-                          <a:sym typeface="Helvetica"/>
+                          <a:latin typeface="DejaVu Sans"/>
+                          <a:cs typeface="DejaVu Sans"/>
+                          <a:ea typeface="DejaVu Sans"/>
+                          <a:sym typeface="DejaVu Sans"/>
                         </a:rPr>
                         <a:t>-</a:t>
                       </a:r>
@@ -7788,7 +7788,7 @@
                   </a:tcPr>
                 </a:tc>
               </a:tr>
-              <a:tr h="361524">
+              <a:tr h="366435">
                 <a:tc>
                   <a:txBody>
                     <a:bodyPr/>
@@ -7813,10 +7813,10 @@
                               <a:alpha val="100000"/>
                             </a:srgbClr>
                           </a:solidFill>
-                          <a:latin typeface="Helvetica"/>
-                          <a:cs typeface="Helvetica"/>
-                          <a:ea typeface="Helvetica"/>
-                          <a:sym typeface="Helvetica"/>
+                          <a:latin typeface="DejaVu Sans"/>
+                          <a:cs typeface="DejaVu Sans"/>
+                          <a:ea typeface="DejaVu Sans"/>
+                          <a:sym typeface="DejaVu Sans"/>
                         </a:rPr>
                         <a:t>2009</a:t>
                       </a:r>
@@ -7878,10 +7878,10 @@
                               <a:alpha val="100000"/>
                             </a:srgbClr>
                           </a:solidFill>
-                          <a:latin typeface="Helvetica"/>
-                          <a:cs typeface="Helvetica"/>
-                          <a:ea typeface="Helvetica"/>
-                          <a:sym typeface="Helvetica"/>
+                          <a:latin typeface="DejaVu Sans"/>
+                          <a:cs typeface="DejaVu Sans"/>
+                          <a:ea typeface="DejaVu Sans"/>
+                          <a:sym typeface="DejaVu Sans"/>
                         </a:rPr>
                         <a:t>10</a:t>
                       </a:r>
@@ -7939,10 +7939,10 @@
                               <a:alpha val="100000"/>
                             </a:srgbClr>
                           </a:solidFill>
-                          <a:latin typeface="Helvetica"/>
-                          <a:cs typeface="Helvetica"/>
-                          <a:ea typeface="Helvetica"/>
-                          <a:sym typeface="Helvetica"/>
+                          <a:latin typeface="DejaVu Sans"/>
+                          <a:cs typeface="DejaVu Sans"/>
+                          <a:ea typeface="DejaVu Sans"/>
+                          <a:sym typeface="DejaVu Sans"/>
                         </a:rPr>
                         <a:t>10</a:t>
                       </a:r>
@@ -8000,10 +8000,10 @@
                               <a:alpha val="100000"/>
                             </a:srgbClr>
                           </a:solidFill>
-                          <a:latin typeface="Helvetica"/>
-                          <a:cs typeface="Helvetica"/>
-                          <a:ea typeface="Helvetica"/>
-                          <a:sym typeface="Helvetica"/>
+                          <a:latin typeface="DejaVu Sans"/>
+                          <a:cs typeface="DejaVu Sans"/>
+                          <a:ea typeface="DejaVu Sans"/>
+                          <a:sym typeface="DejaVu Sans"/>
                         </a:rPr>
                         <a:t>12</a:t>
                       </a:r>
@@ -8061,10 +8061,10 @@
                               <a:alpha val="100000"/>
                             </a:srgbClr>
                           </a:solidFill>
-                          <a:latin typeface="Helvetica"/>
-                          <a:cs typeface="Helvetica"/>
-                          <a:ea typeface="Helvetica"/>
-                          <a:sym typeface="Helvetica"/>
+                          <a:latin typeface="DejaVu Sans"/>
+                          <a:cs typeface="DejaVu Sans"/>
+                          <a:ea typeface="DejaVu Sans"/>
+                          <a:sym typeface="DejaVu Sans"/>
                         </a:rPr>
                         <a:t>12</a:t>
                       </a:r>
@@ -8122,10 +8122,10 @@
                               <a:alpha val="100000"/>
                             </a:srgbClr>
                           </a:solidFill>
-                          <a:latin typeface="Helvetica"/>
-                          <a:cs typeface="Helvetica"/>
-                          <a:ea typeface="Helvetica"/>
-                          <a:sym typeface="Helvetica"/>
+                          <a:latin typeface="DejaVu Sans"/>
+                          <a:cs typeface="DejaVu Sans"/>
+                          <a:ea typeface="DejaVu Sans"/>
+                          <a:sym typeface="DejaVu Sans"/>
                         </a:rPr>
                         <a:t>-</a:t>
                       </a:r>
@@ -8183,10 +8183,10 @@
                               <a:alpha val="100000"/>
                             </a:srgbClr>
                           </a:solidFill>
-                          <a:latin typeface="Helvetica"/>
-                          <a:cs typeface="Helvetica"/>
-                          <a:ea typeface="Helvetica"/>
-                          <a:sym typeface="Helvetica"/>
+                          <a:latin typeface="DejaVu Sans"/>
+                          <a:cs typeface="DejaVu Sans"/>
+                          <a:ea typeface="DejaVu Sans"/>
+                          <a:sym typeface="DejaVu Sans"/>
                         </a:rPr>
                         <a:t>-</a:t>
                       </a:r>
@@ -8221,7 +8221,7 @@
                   </a:tcPr>
                 </a:tc>
               </a:tr>
-              <a:tr h="363434">
+              <a:tr h="368891">
                 <a:tc>
                   <a:txBody>
                     <a:bodyPr/>
@@ -8246,10 +8246,10 @@
                               <a:alpha val="100000"/>
                             </a:srgbClr>
                           </a:solidFill>
-                          <a:latin typeface="Helvetica"/>
-                          <a:cs typeface="Helvetica"/>
-                          <a:ea typeface="Helvetica"/>
-                          <a:sym typeface="Helvetica"/>
+                          <a:latin typeface="DejaVu Sans"/>
+                          <a:cs typeface="DejaVu Sans"/>
+                          <a:ea typeface="DejaVu Sans"/>
+                          <a:sym typeface="DejaVu Sans"/>
                         </a:rPr>
                         <a:t>Maximum</a:t>
                       </a:r>
@@ -8311,10 +8311,10 @@
                               <a:alpha val="100000"/>
                             </a:srgbClr>
                           </a:solidFill>
-                          <a:latin typeface="Helvetica"/>
-                          <a:cs typeface="Helvetica"/>
-                          <a:ea typeface="Helvetica"/>
-                          <a:sym typeface="Helvetica"/>
+                          <a:latin typeface="DejaVu Sans"/>
+                          <a:cs typeface="DejaVu Sans"/>
+                          <a:ea typeface="DejaVu Sans"/>
+                          <a:sym typeface="DejaVu Sans"/>
                         </a:rPr>
                         <a:t>10</a:t>
                       </a:r>
@@ -8372,10 +8372,10 @@
                               <a:alpha val="100000"/>
                             </a:srgbClr>
                           </a:solidFill>
-                          <a:latin typeface="Helvetica"/>
-                          <a:cs typeface="Helvetica"/>
-                          <a:ea typeface="Helvetica"/>
-                          <a:sym typeface="Helvetica"/>
+                          <a:latin typeface="DejaVu Sans"/>
+                          <a:cs typeface="DejaVu Sans"/>
+                          <a:ea typeface="DejaVu Sans"/>
+                          <a:sym typeface="DejaVu Sans"/>
                         </a:rPr>
                         <a:t>10</a:t>
                       </a:r>
@@ -8433,10 +8433,10 @@
                               <a:alpha val="100000"/>
                             </a:srgbClr>
                           </a:solidFill>
-                          <a:latin typeface="Helvetica"/>
-                          <a:cs typeface="Helvetica"/>
-                          <a:ea typeface="Helvetica"/>
-                          <a:sym typeface="Helvetica"/>
+                          <a:latin typeface="DejaVu Sans"/>
+                          <a:cs typeface="DejaVu Sans"/>
+                          <a:ea typeface="DejaVu Sans"/>
+                          <a:sym typeface="DejaVu Sans"/>
                         </a:rPr>
                         <a:t>13</a:t>
                       </a:r>
@@ -8494,10 +8494,10 @@
                               <a:alpha val="100000"/>
                             </a:srgbClr>
                           </a:solidFill>
-                          <a:latin typeface="Helvetica"/>
-                          <a:cs typeface="Helvetica"/>
-                          <a:ea typeface="Helvetica"/>
-                          <a:sym typeface="Helvetica"/>
+                          <a:latin typeface="DejaVu Sans"/>
+                          <a:cs typeface="DejaVu Sans"/>
+                          <a:ea typeface="DejaVu Sans"/>
+                          <a:sym typeface="DejaVu Sans"/>
                         </a:rPr>
                         <a:t>13</a:t>
                       </a:r>
@@ -8555,10 +8555,10 @@
                               <a:alpha val="100000"/>
                             </a:srgbClr>
                           </a:solidFill>
-                          <a:latin typeface="Helvetica"/>
-                          <a:cs typeface="Helvetica"/>
-                          <a:ea typeface="Helvetica"/>
-                          <a:sym typeface="Helvetica"/>
+                          <a:latin typeface="DejaVu Sans"/>
+                          <a:cs typeface="DejaVu Sans"/>
+                          <a:ea typeface="DejaVu Sans"/>
+                          <a:sym typeface="DejaVu Sans"/>
                         </a:rPr>
                         <a:t>-</a:t>
                       </a:r>
@@ -8616,10 +8616,10 @@
                               <a:alpha val="100000"/>
                             </a:srgbClr>
                           </a:solidFill>
-                          <a:latin typeface="Helvetica"/>
-                          <a:cs typeface="Helvetica"/>
-                          <a:ea typeface="Helvetica"/>
-                          <a:sym typeface="Helvetica"/>
+                          <a:latin typeface="DejaVu Sans"/>
+                          <a:cs typeface="DejaVu Sans"/>
+                          <a:ea typeface="DejaVu Sans"/>
+                          <a:sym typeface="DejaVu Sans"/>
                         </a:rPr>
                         <a:t>-</a:t>
                       </a:r>
@@ -8654,7 +8654,7 @@
                   </a:tcPr>
                 </a:tc>
               </a:tr>
-              <a:tr h="363638">
+              <a:tr h="368891">
                 <a:tc>
                   <a:txBody>
                     <a:bodyPr/>
@@ -8679,10 +8679,10 @@
                               <a:alpha val="100000"/>
                             </a:srgbClr>
                           </a:solidFill>
-                          <a:latin typeface="Helvetica"/>
-                          <a:cs typeface="Helvetica"/>
-                          <a:ea typeface="Helvetica"/>
-                          <a:sym typeface="Helvetica"/>
+                          <a:latin typeface="DejaVu Sans"/>
+                          <a:cs typeface="DejaVu Sans"/>
+                          <a:ea typeface="DejaVu Sans"/>
+                          <a:sym typeface="DejaVu Sans"/>
                         </a:rPr>
                         <a:t>Total</a:t>
                       </a:r>
@@ -8744,10 +8744,10 @@
                               <a:alpha val="100000"/>
                             </a:srgbClr>
                           </a:solidFill>
-                          <a:latin typeface="Helvetica"/>
-                          <a:cs typeface="Helvetica"/>
-                          <a:ea typeface="Helvetica"/>
-                          <a:sym typeface="Helvetica"/>
+                          <a:latin typeface="DejaVu Sans"/>
+                          <a:cs typeface="DejaVu Sans"/>
+                          <a:ea typeface="DejaVu Sans"/>
+                          <a:sym typeface="DejaVu Sans"/>
                         </a:rPr>
                         <a:t>27</a:t>
                       </a:r>
@@ -8805,10 +8805,10 @@
                               <a:alpha val="100000"/>
                             </a:srgbClr>
                           </a:solidFill>
-                          <a:latin typeface="Helvetica"/>
-                          <a:cs typeface="Helvetica"/>
-                          <a:ea typeface="Helvetica"/>
-                          <a:sym typeface="Helvetica"/>
+                          <a:latin typeface="DejaVu Sans"/>
+                          <a:cs typeface="DejaVu Sans"/>
+                          <a:ea typeface="DejaVu Sans"/>
+                          <a:sym typeface="DejaVu Sans"/>
                         </a:rPr>
                         <a:t>28</a:t>
                       </a:r>
@@ -8866,10 +8866,10 @@
                               <a:alpha val="100000"/>
                             </a:srgbClr>
                           </a:solidFill>
-                          <a:latin typeface="Helvetica"/>
-                          <a:cs typeface="Helvetica"/>
-                          <a:ea typeface="Helvetica"/>
-                          <a:sym typeface="Helvetica"/>
+                          <a:latin typeface="DejaVu Sans"/>
+                          <a:cs typeface="DejaVu Sans"/>
+                          <a:ea typeface="DejaVu Sans"/>
+                          <a:sym typeface="DejaVu Sans"/>
                         </a:rPr>
                         <a:t>34</a:t>
                       </a:r>
@@ -8927,10 +8927,10 @@
                               <a:alpha val="100000"/>
                             </a:srgbClr>
                           </a:solidFill>
-                          <a:latin typeface="Helvetica"/>
-                          <a:cs typeface="Helvetica"/>
-                          <a:ea typeface="Helvetica"/>
-                          <a:sym typeface="Helvetica"/>
+                          <a:latin typeface="DejaVu Sans"/>
+                          <a:cs typeface="DejaVu Sans"/>
+                          <a:ea typeface="DejaVu Sans"/>
+                          <a:sym typeface="DejaVu Sans"/>
                         </a:rPr>
                         <a:t>34</a:t>
                       </a:r>
@@ -8988,10 +8988,10 @@
                               <a:alpha val="100000"/>
                             </a:srgbClr>
                           </a:solidFill>
-                          <a:latin typeface="Helvetica"/>
-                          <a:cs typeface="Helvetica"/>
-                          <a:ea typeface="Helvetica"/>
-                          <a:sym typeface="Helvetica"/>
+                          <a:latin typeface="DejaVu Sans"/>
+                          <a:cs typeface="DejaVu Sans"/>
+                          <a:ea typeface="DejaVu Sans"/>
+                          <a:sym typeface="DejaVu Sans"/>
                         </a:rPr>
                         <a:t>-</a:t>
                       </a:r>
@@ -9049,10 +9049,10 @@
                               <a:alpha val="100000"/>
                             </a:srgbClr>
                           </a:solidFill>
-                          <a:latin typeface="Helvetica"/>
-                          <a:cs typeface="Helvetica"/>
-                          <a:ea typeface="Helvetica"/>
-                          <a:sym typeface="Helvetica"/>
+                          <a:latin typeface="DejaVu Sans"/>
+                          <a:cs typeface="DejaVu Sans"/>
+                          <a:ea typeface="DejaVu Sans"/>
+                          <a:sym typeface="DejaVu Sans"/>
                         </a:rPr>
                         <a:t>-</a:t>
                       </a:r>
@@ -9087,7 +9087,7 @@
                   </a:tcPr>
                 </a:tc>
               </a:tr>
-              <a:tr h="401937">
+              <a:tr h="403500">
                 <a:tc gridSpan="7">
                   <a:txBody>
                     <a:bodyPr/>
@@ -9544,7 +9544,7 @@
                   </a:tcPr>
                 </a:tc>
               </a:tr>
-              <a:tr h="361524">
+              <a:tr h="366435">
                 <a:tc>
                   <a:txBody>
                     <a:bodyPr/>
@@ -9569,10 +9569,10 @@
                               <a:alpha val="100000"/>
                             </a:srgbClr>
                           </a:solidFill>
-                          <a:latin typeface="Helvetica"/>
-                          <a:cs typeface="Helvetica"/>
-                          <a:ea typeface="Helvetica"/>
-                          <a:sym typeface="Helvetica"/>
+                          <a:latin typeface="DejaVu Sans"/>
+                          <a:cs typeface="DejaVu Sans"/>
+                          <a:ea typeface="DejaVu Sans"/>
+                          <a:sym typeface="DejaVu Sans"/>
                         </a:rPr>
                         <a:t>2007</a:t>
                       </a:r>
@@ -9634,10 +9634,10 @@
                               <a:alpha val="100000"/>
                             </a:srgbClr>
                           </a:solidFill>
-                          <a:latin typeface="Helvetica"/>
-                          <a:cs typeface="Helvetica"/>
-                          <a:ea typeface="Helvetica"/>
-                          <a:sym typeface="Helvetica"/>
+                          <a:latin typeface="DejaVu Sans"/>
+                          <a:cs typeface="DejaVu Sans"/>
+                          <a:ea typeface="DejaVu Sans"/>
+                          <a:sym typeface="DejaVu Sans"/>
                         </a:rPr>
                         <a:t>8</a:t>
                       </a:r>
@@ -9695,10 +9695,10 @@
                               <a:alpha val="100000"/>
                             </a:srgbClr>
                           </a:solidFill>
-                          <a:latin typeface="Helvetica"/>
-                          <a:cs typeface="Helvetica"/>
-                          <a:ea typeface="Helvetica"/>
-                          <a:sym typeface="Helvetica"/>
+                          <a:latin typeface="DejaVu Sans"/>
+                          <a:cs typeface="DejaVu Sans"/>
+                          <a:ea typeface="DejaVu Sans"/>
+                          <a:sym typeface="DejaVu Sans"/>
                         </a:rPr>
                         <a:t>7</a:t>
                       </a:r>
@@ -9756,10 +9756,10 @@
                               <a:alpha val="100000"/>
                             </a:srgbClr>
                           </a:solidFill>
-                          <a:latin typeface="Helvetica"/>
-                          <a:cs typeface="Helvetica"/>
-                          <a:ea typeface="Helvetica"/>
-                          <a:sym typeface="Helvetica"/>
+                          <a:latin typeface="DejaVu Sans"/>
+                          <a:cs typeface="DejaVu Sans"/>
+                          <a:ea typeface="DejaVu Sans"/>
+                          <a:sym typeface="DejaVu Sans"/>
                         </a:rPr>
                         <a:t>-</a:t>
                       </a:r>
@@ -9817,10 +9817,10 @@
                               <a:alpha val="100000"/>
                             </a:srgbClr>
                           </a:solidFill>
-                          <a:latin typeface="Helvetica"/>
-                          <a:cs typeface="Helvetica"/>
-                          <a:ea typeface="Helvetica"/>
-                          <a:sym typeface="Helvetica"/>
+                          <a:latin typeface="DejaVu Sans"/>
+                          <a:cs typeface="DejaVu Sans"/>
+                          <a:ea typeface="DejaVu Sans"/>
+                          <a:sym typeface="DejaVu Sans"/>
                         </a:rPr>
                         <a:t>-</a:t>
                       </a:r>
@@ -9878,10 +9878,10 @@
                               <a:alpha val="100000"/>
                             </a:srgbClr>
                           </a:solidFill>
-                          <a:latin typeface="Helvetica"/>
-                          <a:cs typeface="Helvetica"/>
-                          <a:ea typeface="Helvetica"/>
-                          <a:sym typeface="Helvetica"/>
+                          <a:latin typeface="DejaVu Sans"/>
+                          <a:cs typeface="DejaVu Sans"/>
+                          <a:ea typeface="DejaVu Sans"/>
+                          <a:sym typeface="DejaVu Sans"/>
                         </a:rPr>
                         <a:t>-</a:t>
                       </a:r>
@@ -9939,10 +9939,10 @@
                               <a:alpha val="100000"/>
                             </a:srgbClr>
                           </a:solidFill>
-                          <a:latin typeface="Helvetica"/>
-                          <a:cs typeface="Helvetica"/>
-                          <a:ea typeface="Helvetica"/>
-                          <a:sym typeface="Helvetica"/>
+                          <a:latin typeface="DejaVu Sans"/>
+                          <a:cs typeface="DejaVu Sans"/>
+                          <a:ea typeface="DejaVu Sans"/>
+                          <a:sym typeface="DejaVu Sans"/>
                         </a:rPr>
                         <a:t>-</a:t>
                       </a:r>
@@ -9977,7 +9977,7 @@
                   </a:tcPr>
                 </a:tc>
               </a:tr>
-              <a:tr h="361592">
+              <a:tr h="366435">
                 <a:tc>
                   <a:txBody>
                     <a:bodyPr/>
@@ -10002,10 +10002,10 @@
                               <a:alpha val="100000"/>
                             </a:srgbClr>
                           </a:solidFill>
-                          <a:latin typeface="Helvetica"/>
-                          <a:cs typeface="Helvetica"/>
-                          <a:ea typeface="Helvetica"/>
-                          <a:sym typeface="Helvetica"/>
+                          <a:latin typeface="DejaVu Sans"/>
+                          <a:cs typeface="DejaVu Sans"/>
+                          <a:ea typeface="DejaVu Sans"/>
+                          <a:sym typeface="DejaVu Sans"/>
                         </a:rPr>
                         <a:t>2008</a:t>
                       </a:r>
@@ -10063,10 +10063,10 @@
                               <a:alpha val="100000"/>
                             </a:srgbClr>
                           </a:solidFill>
-                          <a:latin typeface="Helvetica"/>
-                          <a:cs typeface="Helvetica"/>
-                          <a:ea typeface="Helvetica"/>
-                          <a:sym typeface="Helvetica"/>
+                          <a:latin typeface="DejaVu Sans"/>
+                          <a:cs typeface="DejaVu Sans"/>
+                          <a:ea typeface="DejaVu Sans"/>
+                          <a:sym typeface="DejaVu Sans"/>
                         </a:rPr>
                         <a:t>8</a:t>
                       </a:r>
@@ -10120,10 +10120,10 @@
                               <a:alpha val="100000"/>
                             </a:srgbClr>
                           </a:solidFill>
-                          <a:latin typeface="Helvetica"/>
-                          <a:cs typeface="Helvetica"/>
-                          <a:ea typeface="Helvetica"/>
-                          <a:sym typeface="Helvetica"/>
+                          <a:latin typeface="DejaVu Sans"/>
+                          <a:cs typeface="DejaVu Sans"/>
+                          <a:ea typeface="DejaVu Sans"/>
+                          <a:sym typeface="DejaVu Sans"/>
                         </a:rPr>
                         <a:t>8</a:t>
                       </a:r>
@@ -10177,10 +10177,10 @@
                               <a:alpha val="100000"/>
                             </a:srgbClr>
                           </a:solidFill>
-                          <a:latin typeface="Helvetica"/>
-                          <a:cs typeface="Helvetica"/>
-                          <a:ea typeface="Helvetica"/>
-                          <a:sym typeface="Helvetica"/>
+                          <a:latin typeface="DejaVu Sans"/>
+                          <a:cs typeface="DejaVu Sans"/>
+                          <a:ea typeface="DejaVu Sans"/>
+                          <a:sym typeface="DejaVu Sans"/>
                         </a:rPr>
                         <a:t>-</a:t>
                       </a:r>
@@ -10234,10 +10234,10 @@
                               <a:alpha val="100000"/>
                             </a:srgbClr>
                           </a:solidFill>
-                          <a:latin typeface="Helvetica"/>
-                          <a:cs typeface="Helvetica"/>
-                          <a:ea typeface="Helvetica"/>
-                          <a:sym typeface="Helvetica"/>
+                          <a:latin typeface="DejaVu Sans"/>
+                          <a:cs typeface="DejaVu Sans"/>
+                          <a:ea typeface="DejaVu Sans"/>
+                          <a:sym typeface="DejaVu Sans"/>
                         </a:rPr>
                         <a:t>-</a:t>
                       </a:r>
@@ -10291,10 +10291,10 @@
                               <a:alpha val="100000"/>
                             </a:srgbClr>
                           </a:solidFill>
-                          <a:latin typeface="Helvetica"/>
-                          <a:cs typeface="Helvetica"/>
-                          <a:ea typeface="Helvetica"/>
-                          <a:sym typeface="Helvetica"/>
+                          <a:latin typeface="DejaVu Sans"/>
+                          <a:cs typeface="DejaVu Sans"/>
+                          <a:ea typeface="DejaVu Sans"/>
+                          <a:sym typeface="DejaVu Sans"/>
                         </a:rPr>
                         <a:t>-</a:t>
                       </a:r>
@@ -10348,10 +10348,10 @@
                               <a:alpha val="100000"/>
                             </a:srgbClr>
                           </a:solidFill>
-                          <a:latin typeface="Helvetica"/>
-                          <a:cs typeface="Helvetica"/>
-                          <a:ea typeface="Helvetica"/>
-                          <a:sym typeface="Helvetica"/>
+                          <a:latin typeface="DejaVu Sans"/>
+                          <a:cs typeface="DejaVu Sans"/>
+                          <a:ea typeface="DejaVu Sans"/>
+                          <a:sym typeface="DejaVu Sans"/>
                         </a:rPr>
                         <a:t>-</a:t>
                       </a:r>
@@ -10382,7 +10382,7 @@
                   </a:tcPr>
                 </a:tc>
               </a:tr>
-              <a:tr h="361524">
+              <a:tr h="366435">
                 <a:tc>
                   <a:txBody>
                     <a:bodyPr/>
@@ -10407,10 +10407,10 @@
                               <a:alpha val="100000"/>
                             </a:srgbClr>
                           </a:solidFill>
-                          <a:latin typeface="Helvetica"/>
-                          <a:cs typeface="Helvetica"/>
-                          <a:ea typeface="Helvetica"/>
-                          <a:sym typeface="Helvetica"/>
+                          <a:latin typeface="DejaVu Sans"/>
+                          <a:cs typeface="DejaVu Sans"/>
+                          <a:ea typeface="DejaVu Sans"/>
+                          <a:sym typeface="DejaVu Sans"/>
                         </a:rPr>
                         <a:t>2009</a:t>
                       </a:r>
@@ -10472,10 +10472,10 @@
                               <a:alpha val="100000"/>
                             </a:srgbClr>
                           </a:solidFill>
-                          <a:latin typeface="Helvetica"/>
-                          <a:cs typeface="Helvetica"/>
-                          <a:ea typeface="Helvetica"/>
-                          <a:sym typeface="Helvetica"/>
+                          <a:latin typeface="DejaVu Sans"/>
+                          <a:cs typeface="DejaVu Sans"/>
+                          <a:ea typeface="DejaVu Sans"/>
+                          <a:sym typeface="DejaVu Sans"/>
                         </a:rPr>
                         <a:t>8</a:t>
                       </a:r>
@@ -10533,10 +10533,10 @@
                               <a:alpha val="100000"/>
                             </a:srgbClr>
                           </a:solidFill>
-                          <a:latin typeface="Helvetica"/>
-                          <a:cs typeface="Helvetica"/>
-                          <a:ea typeface="Helvetica"/>
-                          <a:sym typeface="Helvetica"/>
+                          <a:latin typeface="DejaVu Sans"/>
+                          <a:cs typeface="DejaVu Sans"/>
+                          <a:ea typeface="DejaVu Sans"/>
+                          <a:sym typeface="DejaVu Sans"/>
                         </a:rPr>
                         <a:t>8</a:t>
                       </a:r>
@@ -10594,10 +10594,10 @@
                               <a:alpha val="100000"/>
                             </a:srgbClr>
                           </a:solidFill>
-                          <a:latin typeface="Helvetica"/>
-                          <a:cs typeface="Helvetica"/>
-                          <a:ea typeface="Helvetica"/>
-                          <a:sym typeface="Helvetica"/>
+                          <a:latin typeface="DejaVu Sans"/>
+                          <a:cs typeface="DejaVu Sans"/>
+                          <a:ea typeface="DejaVu Sans"/>
+                          <a:sym typeface="DejaVu Sans"/>
                         </a:rPr>
                         <a:t>-</a:t>
                       </a:r>
@@ -10655,10 +10655,10 @@
                               <a:alpha val="100000"/>
                             </a:srgbClr>
                           </a:solidFill>
-                          <a:latin typeface="Helvetica"/>
-                          <a:cs typeface="Helvetica"/>
-                          <a:ea typeface="Helvetica"/>
-                          <a:sym typeface="Helvetica"/>
+                          <a:latin typeface="DejaVu Sans"/>
+                          <a:cs typeface="DejaVu Sans"/>
+                          <a:ea typeface="DejaVu Sans"/>
+                          <a:sym typeface="DejaVu Sans"/>
                         </a:rPr>
                         <a:t>-</a:t>
                       </a:r>
@@ -10716,10 +10716,10 @@
                               <a:alpha val="100000"/>
                             </a:srgbClr>
                           </a:solidFill>
-                          <a:latin typeface="Helvetica"/>
-                          <a:cs typeface="Helvetica"/>
-                          <a:ea typeface="Helvetica"/>
-                          <a:sym typeface="Helvetica"/>
+                          <a:latin typeface="DejaVu Sans"/>
+                          <a:cs typeface="DejaVu Sans"/>
+                          <a:ea typeface="DejaVu Sans"/>
+                          <a:sym typeface="DejaVu Sans"/>
                         </a:rPr>
                         <a:t>-</a:t>
                       </a:r>
@@ -10777,10 +10777,10 @@
                               <a:alpha val="100000"/>
                             </a:srgbClr>
                           </a:solidFill>
-                          <a:latin typeface="Helvetica"/>
-                          <a:cs typeface="Helvetica"/>
-                          <a:ea typeface="Helvetica"/>
-                          <a:sym typeface="Helvetica"/>
+                          <a:latin typeface="DejaVu Sans"/>
+                          <a:cs typeface="DejaVu Sans"/>
+                          <a:ea typeface="DejaVu Sans"/>
+                          <a:sym typeface="DejaVu Sans"/>
                         </a:rPr>
                         <a:t>-</a:t>
                       </a:r>
@@ -10815,7 +10815,7 @@
                   </a:tcPr>
                 </a:tc>
               </a:tr>
-              <a:tr h="363434">
+              <a:tr h="368891">
                 <a:tc>
                   <a:txBody>
                     <a:bodyPr/>
@@ -10840,10 +10840,10 @@
                               <a:alpha val="100000"/>
                             </a:srgbClr>
                           </a:solidFill>
-                          <a:latin typeface="Helvetica"/>
-                          <a:cs typeface="Helvetica"/>
-                          <a:ea typeface="Helvetica"/>
-                          <a:sym typeface="Helvetica"/>
+                          <a:latin typeface="DejaVu Sans"/>
+                          <a:cs typeface="DejaVu Sans"/>
+                          <a:ea typeface="DejaVu Sans"/>
+                          <a:sym typeface="DejaVu Sans"/>
                         </a:rPr>
                         <a:t>Maximum</a:t>
                       </a:r>
@@ -10905,10 +10905,10 @@
                               <a:alpha val="100000"/>
                             </a:srgbClr>
                           </a:solidFill>
-                          <a:latin typeface="Helvetica"/>
-                          <a:cs typeface="Helvetica"/>
-                          <a:ea typeface="Helvetica"/>
-                          <a:sym typeface="Helvetica"/>
+                          <a:latin typeface="DejaVu Sans"/>
+                          <a:cs typeface="DejaVu Sans"/>
+                          <a:ea typeface="DejaVu Sans"/>
+                          <a:sym typeface="DejaVu Sans"/>
                         </a:rPr>
                         <a:t>8</a:t>
                       </a:r>
@@ -10966,10 +10966,10 @@
                               <a:alpha val="100000"/>
                             </a:srgbClr>
                           </a:solidFill>
-                          <a:latin typeface="Helvetica"/>
-                          <a:cs typeface="Helvetica"/>
-                          <a:ea typeface="Helvetica"/>
-                          <a:sym typeface="Helvetica"/>
+                          <a:latin typeface="DejaVu Sans"/>
+                          <a:cs typeface="DejaVu Sans"/>
+                          <a:ea typeface="DejaVu Sans"/>
+                          <a:sym typeface="DejaVu Sans"/>
                         </a:rPr>
                         <a:t>8</a:t>
                       </a:r>
@@ -11027,10 +11027,10 @@
                               <a:alpha val="100000"/>
                             </a:srgbClr>
                           </a:solidFill>
-                          <a:latin typeface="Helvetica"/>
-                          <a:cs typeface="Helvetica"/>
-                          <a:ea typeface="Helvetica"/>
-                          <a:sym typeface="Helvetica"/>
+                          <a:latin typeface="DejaVu Sans"/>
+                          <a:cs typeface="DejaVu Sans"/>
+                          <a:ea typeface="DejaVu Sans"/>
+                          <a:sym typeface="DejaVu Sans"/>
                         </a:rPr>
                         <a:t>-</a:t>
                       </a:r>
@@ -11088,10 +11088,10 @@
                               <a:alpha val="100000"/>
                             </a:srgbClr>
                           </a:solidFill>
-                          <a:latin typeface="Helvetica"/>
-                          <a:cs typeface="Helvetica"/>
-                          <a:ea typeface="Helvetica"/>
-                          <a:sym typeface="Helvetica"/>
+                          <a:latin typeface="DejaVu Sans"/>
+                          <a:cs typeface="DejaVu Sans"/>
+                          <a:ea typeface="DejaVu Sans"/>
+                          <a:sym typeface="DejaVu Sans"/>
                         </a:rPr>
                         <a:t>-</a:t>
                       </a:r>
@@ -11149,10 +11149,10 @@
                               <a:alpha val="100000"/>
                             </a:srgbClr>
                           </a:solidFill>
-                          <a:latin typeface="Helvetica"/>
-                          <a:cs typeface="Helvetica"/>
-                          <a:ea typeface="Helvetica"/>
-                          <a:sym typeface="Helvetica"/>
+                          <a:latin typeface="DejaVu Sans"/>
+                          <a:cs typeface="DejaVu Sans"/>
+                          <a:ea typeface="DejaVu Sans"/>
+                          <a:sym typeface="DejaVu Sans"/>
                         </a:rPr>
                         <a:t>-</a:t>
                       </a:r>
@@ -11210,10 +11210,10 @@
                               <a:alpha val="100000"/>
                             </a:srgbClr>
                           </a:solidFill>
-                          <a:latin typeface="Helvetica"/>
-                          <a:cs typeface="Helvetica"/>
-                          <a:ea typeface="Helvetica"/>
-                          <a:sym typeface="Helvetica"/>
+                          <a:latin typeface="DejaVu Sans"/>
+                          <a:cs typeface="DejaVu Sans"/>
+                          <a:ea typeface="DejaVu Sans"/>
+                          <a:sym typeface="DejaVu Sans"/>
                         </a:rPr>
                         <a:t>-</a:t>
                       </a:r>
@@ -11248,7 +11248,7 @@
                   </a:tcPr>
                 </a:tc>
               </a:tr>
-              <a:tr h="363638">
+              <a:tr h="368891">
                 <a:tc>
                   <a:txBody>
                     <a:bodyPr/>
@@ -11273,10 +11273,10 @@
                               <a:alpha val="100000"/>
                             </a:srgbClr>
                           </a:solidFill>
-                          <a:latin typeface="Helvetica"/>
-                          <a:cs typeface="Helvetica"/>
-                          <a:ea typeface="Helvetica"/>
-                          <a:sym typeface="Helvetica"/>
+                          <a:latin typeface="DejaVu Sans"/>
+                          <a:cs typeface="DejaVu Sans"/>
+                          <a:ea typeface="DejaVu Sans"/>
+                          <a:sym typeface="DejaVu Sans"/>
                         </a:rPr>
                         <a:t>Total</a:t>
                       </a:r>
@@ -11338,10 +11338,10 @@
                               <a:alpha val="100000"/>
                             </a:srgbClr>
                           </a:solidFill>
-                          <a:latin typeface="Helvetica"/>
-                          <a:cs typeface="Helvetica"/>
-                          <a:ea typeface="Helvetica"/>
-                          <a:sym typeface="Helvetica"/>
+                          <a:latin typeface="DejaVu Sans"/>
+                          <a:cs typeface="DejaVu Sans"/>
+                          <a:ea typeface="DejaVu Sans"/>
+                          <a:sym typeface="DejaVu Sans"/>
                         </a:rPr>
                         <a:t>24</a:t>
                       </a:r>
@@ -11399,10 +11399,10 @@
                               <a:alpha val="100000"/>
                             </a:srgbClr>
                           </a:solidFill>
-                          <a:latin typeface="Helvetica"/>
-                          <a:cs typeface="Helvetica"/>
-                          <a:ea typeface="Helvetica"/>
-                          <a:sym typeface="Helvetica"/>
+                          <a:latin typeface="DejaVu Sans"/>
+                          <a:cs typeface="DejaVu Sans"/>
+                          <a:ea typeface="DejaVu Sans"/>
+                          <a:sym typeface="DejaVu Sans"/>
                         </a:rPr>
                         <a:t>23</a:t>
                       </a:r>
@@ -11460,10 +11460,10 @@
                               <a:alpha val="100000"/>
                             </a:srgbClr>
                           </a:solidFill>
-                          <a:latin typeface="Helvetica"/>
-                          <a:cs typeface="Helvetica"/>
-                          <a:ea typeface="Helvetica"/>
-                          <a:sym typeface="Helvetica"/>
+                          <a:latin typeface="DejaVu Sans"/>
+                          <a:cs typeface="DejaVu Sans"/>
+                          <a:ea typeface="DejaVu Sans"/>
+                          <a:sym typeface="DejaVu Sans"/>
                         </a:rPr>
                         <a:t>-</a:t>
                       </a:r>
@@ -11521,10 +11521,10 @@
                               <a:alpha val="100000"/>
                             </a:srgbClr>
                           </a:solidFill>
-                          <a:latin typeface="Helvetica"/>
-                          <a:cs typeface="Helvetica"/>
-                          <a:ea typeface="Helvetica"/>
-                          <a:sym typeface="Helvetica"/>
+                          <a:latin typeface="DejaVu Sans"/>
+                          <a:cs typeface="DejaVu Sans"/>
+                          <a:ea typeface="DejaVu Sans"/>
+                          <a:sym typeface="DejaVu Sans"/>
                         </a:rPr>
                         <a:t>-</a:t>
                       </a:r>
@@ -11582,10 +11582,10 @@
                               <a:alpha val="100000"/>
                             </a:srgbClr>
                           </a:solidFill>
-                          <a:latin typeface="Helvetica"/>
-                          <a:cs typeface="Helvetica"/>
-                          <a:ea typeface="Helvetica"/>
-                          <a:sym typeface="Helvetica"/>
+                          <a:latin typeface="DejaVu Sans"/>
+                          <a:cs typeface="DejaVu Sans"/>
+                          <a:ea typeface="DejaVu Sans"/>
+                          <a:sym typeface="DejaVu Sans"/>
                         </a:rPr>
                         <a:t>-</a:t>
                       </a:r>
@@ -11643,10 +11643,10 @@
                               <a:alpha val="100000"/>
                             </a:srgbClr>
                           </a:solidFill>
-                          <a:latin typeface="Helvetica"/>
-                          <a:cs typeface="Helvetica"/>
-                          <a:ea typeface="Helvetica"/>
-                          <a:sym typeface="Helvetica"/>
+                          <a:latin typeface="DejaVu Sans"/>
+                          <a:cs typeface="DejaVu Sans"/>
+                          <a:ea typeface="DejaVu Sans"/>
+                          <a:sym typeface="DejaVu Sans"/>
                         </a:rPr>
                         <a:t>-</a:t>
                       </a:r>

</xml_diff>